<commit_message>
added final analysis summarization
</commit_message>
<xml_diff>
--- a/530 Final.pptx
+++ b/530 Final.pptx
@@ -12,6 +12,9 @@
     <p:sldId id="259" r:id="rId6"/>
     <p:sldId id="260" r:id="rId7"/>
     <p:sldId id="261" r:id="rId8"/>
+    <p:sldId id="263" r:id="rId9"/>
+    <p:sldId id="264" r:id="rId10"/>
+    <p:sldId id="265" r:id="rId11"/>
   </p:sldIdLst>
   <p:sldSz cx="9144000" cy="6858000" type="screen4x3"/>
   <p:notesSz cx="6858000" cy="9144000"/>
@@ -3943,6 +3946,121 @@
 </p:sld>
 </file>
 
+<file path=ppt/slides/slide10.xml><?xml version="1.0" encoding="utf-8"?>
+<p:sld xmlns:a="http://schemas.openxmlformats.org/drawingml/2006/main" xmlns:r="http://schemas.openxmlformats.org/officeDocument/2006/relationships" xmlns:p="http://schemas.openxmlformats.org/presentationml/2006/main">
+  <p:cSld>
+    <p:spTree>
+      <p:nvGrpSpPr>
+        <p:cNvPr id="1" name=""/>
+        <p:cNvGrpSpPr/>
+        <p:nvPr/>
+      </p:nvGrpSpPr>
+      <p:grpSpPr>
+        <a:xfrm>
+          <a:off x="0" y="0"/>
+          <a:ext cx="0" cy="0"/>
+          <a:chOff x="0" y="0"/>
+          <a:chExt cx="0" cy="0"/>
+        </a:xfrm>
+      </p:grpSpPr>
+      <p:sp>
+        <p:nvSpPr>
+          <p:cNvPr id="2" name="Title 1"/>
+          <p:cNvSpPr>
+            <a:spLocks noGrp="1"/>
+          </p:cNvSpPr>
+          <p:nvPr>
+            <p:ph type="title"/>
+          </p:nvPr>
+        </p:nvSpPr>
+        <p:spPr/>
+        <p:txBody>
+          <a:bodyPr>
+            <a:normAutofit/>
+          </a:bodyPr>
+          <a:lstStyle/>
+          <a:p>
+            <a:r>
+              <a:rPr lang="en-US" dirty="0" smtClean="0"/>
+              <a:t>P Test</a:t>
+            </a:r>
+            <a:endParaRPr lang="en-US" dirty="0"/>
+          </a:p>
+        </p:txBody>
+      </p:sp>
+      <p:sp>
+        <p:nvSpPr>
+          <p:cNvPr id="3" name="Content Placeholder 2"/>
+          <p:cNvSpPr>
+            <a:spLocks noGrp="1"/>
+          </p:cNvSpPr>
+          <p:nvPr>
+            <p:ph idx="1"/>
+          </p:nvPr>
+        </p:nvSpPr>
+        <p:spPr/>
+        <p:txBody>
+          <a:bodyPr/>
+          <a:lstStyle/>
+          <a:p>
+            <a:r>
+              <a:rPr lang="en-US" dirty="0" smtClean="0"/>
+              <a:t>result = sm.ols(formula='RAIN ~ </a:t>
+            </a:r>
+            <a:r>
+              <a:rPr lang="en-US" dirty="0" err="1" smtClean="0"/>
+              <a:t>YEAR',data</a:t>
+            </a:r>
+            <a:r>
+              <a:rPr lang="en-US" dirty="0" smtClean="0"/>
+              <a:t>=</a:t>
+            </a:r>
+            <a:r>
+              <a:rPr lang="en-US" dirty="0" err="1" smtClean="0"/>
+              <a:t>rain_per_year</a:t>
+            </a:r>
+            <a:r>
+              <a:rPr lang="en-US" dirty="0" smtClean="0"/>
+              <a:t>).fit() </a:t>
+            </a:r>
+            <a:endParaRPr lang="en-US" dirty="0" smtClean="0"/>
+          </a:p>
+          <a:p>
+            <a:r>
+              <a:rPr lang="en-US" dirty="0" err="1" smtClean="0"/>
+              <a:t>result.pvalues</a:t>
+            </a:r>
+            <a:endParaRPr lang="en-US" dirty="0" smtClean="0"/>
+          </a:p>
+          <a:p>
+            <a:pPr lvl="1"/>
+            <a:r>
+              <a:rPr lang="en-US" dirty="0" err="1" smtClean="0"/>
+              <a:t>Pvalues</a:t>
+            </a:r>
+            <a:r>
+              <a:rPr lang="en-US" dirty="0" smtClean="0"/>
+              <a:t> of the intercept </a:t>
+            </a:r>
+            <a:r>
+              <a:rPr lang="en-US" dirty="0" smtClean="0"/>
+              <a:t>are </a:t>
+            </a:r>
+            <a:r>
+              <a:rPr lang="en-US" dirty="0" smtClean="0"/>
+              <a:t>0.039904,  and close but not statistically significant. </a:t>
+            </a:r>
+          </a:p>
+        </p:txBody>
+      </p:sp>
+    </p:spTree>
+  </p:cSld>
+  <p:clrMapOvr>
+    <a:masterClrMapping/>
+  </p:clrMapOvr>
+</p:sld>
+</file>
+
 <file path=ppt/slides/slide2.xml><?xml version="1.0" encoding="utf-8"?>
 <p:sld xmlns:a="http://schemas.openxmlformats.org/drawingml/2006/main" xmlns:r="http://schemas.openxmlformats.org/officeDocument/2006/relationships" xmlns:p="http://schemas.openxmlformats.org/presentationml/2006/main">
   <p:cSld>
@@ -4000,33 +4118,13 @@
           <a:p>
             <a:r>
               <a:rPr lang="en-US" dirty="0" smtClean="0"/>
-              <a:t>Hypothesis :</a:t>
-            </a:r>
+              <a:t>Hypothesis :Rain has been steadily increasing in Seattle.</a:t>
+            </a:r>
+          </a:p>
+          <a:p>
             <a:r>
               <a:rPr lang="en-US" dirty="0" smtClean="0"/>
-              <a:t>Rain </a:t>
-            </a:r>
-            <a:r>
-              <a:rPr lang="en-US" dirty="0" smtClean="0"/>
-              <a:t>has been steadily increasing in Seattle.</a:t>
-            </a:r>
-          </a:p>
-          <a:p>
-            <a:r>
-              <a:rPr lang="en-US" dirty="0" smtClean="0"/>
-              <a:t>Null Hypothesis: Rain has </a:t>
-            </a:r>
-            <a:r>
-              <a:rPr lang="en-US" dirty="0" smtClean="0"/>
-              <a:t>not </a:t>
-            </a:r>
-            <a:r>
-              <a:rPr lang="en-US" dirty="0" smtClean="0"/>
-              <a:t>increased or changed over </a:t>
-            </a:r>
-            <a:r>
-              <a:rPr lang="en-US" dirty="0" smtClean="0"/>
-              <a:t>time</a:t>
+              <a:t>Null Hypothesis: Rain has not increased or changed over time</a:t>
             </a:r>
           </a:p>
           <a:p>
@@ -4034,7 +4132,6 @@
               <a:rPr lang="en-US" dirty="0" smtClean="0"/>
               <a:t>The hypothesis turned out to be wrong, but I did find that temperatures have been increasing steadily in Seattle, and let’s review how I got there</a:t>
             </a:r>
-            <a:endParaRPr lang="en-US" dirty="0" smtClean="0"/>
           </a:p>
         </p:txBody>
       </p:sp>
@@ -4127,13 +4224,8 @@
           <a:p>
             <a:r>
               <a:rPr lang="en-US" dirty="0" smtClean="0"/>
-              <a:t>RAIN: TRUE if rain was observed on that day, FALSE if it was </a:t>
-            </a:r>
-            <a:r>
-              <a:rPr lang="en-US" dirty="0" smtClean="0"/>
-              <a:t>not</a:t>
-            </a:r>
-            <a:endParaRPr lang="en-US" dirty="0" smtClean="0"/>
+              <a:t>RAIN: TRUE if rain was observed on that day, FALSE if it was not</a:t>
+            </a:r>
           </a:p>
         </p:txBody>
       </p:sp>
@@ -4426,11 +4518,7 @@
             <a:pPr lvl="1"/>
             <a:r>
               <a:rPr lang="en-US" sz="1800" dirty="0" smtClean="0"/>
-              <a:t>Mean</a:t>
-            </a:r>
-            <a:r>
-              <a:rPr lang="en-US" sz="1800" dirty="0" smtClean="0"/>
-              <a:t>: 0.11</a:t>
+              <a:t>Mean: 0.11</a:t>
             </a:r>
           </a:p>
           <a:p>
@@ -4451,30 +4539,14 @@
             <a:pPr lvl="1"/>
             <a:r>
               <a:rPr lang="en-US" sz="1800" dirty="0" smtClean="0"/>
-              <a:t>Std:  </a:t>
-            </a:r>
+              <a:t>Std:  0.24</a:t>
+            </a:r>
+          </a:p>
+          <a:p>
+            <a:pPr lvl="1"/>
             <a:r>
               <a:rPr lang="en-US" sz="1800" dirty="0" smtClean="0"/>
-              <a:t>0.24</a:t>
-            </a:r>
-          </a:p>
-          <a:p>
-            <a:pPr lvl="1"/>
-            <a:r>
-              <a:rPr lang="en-US" sz="1800" dirty="0" smtClean="0"/>
-              <a:t>Range: </a:t>
-            </a:r>
-            <a:r>
-              <a:rPr lang="en-US" sz="1800" dirty="0" smtClean="0"/>
-              <a:t>5.02</a:t>
-            </a:r>
-            <a:r>
-              <a:rPr lang="en-US" sz="1800" dirty="0" smtClean="0"/>
-              <a:t>, </a:t>
-            </a:r>
-            <a:r>
-              <a:rPr lang="en-US" sz="1800" dirty="0" smtClean="0"/>
-              <a:t>0.0</a:t>
+              <a:t>Range: 5.02, 0.0</a:t>
             </a:r>
           </a:p>
           <a:p>
@@ -4487,13 +4559,8 @@
             <a:pPr lvl="1"/>
             <a:r>
               <a:rPr lang="en-US" sz="1800" dirty="0" smtClean="0"/>
-              <a:t>Mean: </a:t>
-            </a:r>
-            <a:r>
-              <a:rPr lang="en-US" sz="1800" dirty="0" smtClean="0"/>
-              <a:t>59.54</a:t>
-            </a:r>
-            <a:endParaRPr lang="en-US" sz="1800" dirty="0" smtClean="0"/>
+              <a:t>Mean: 59.54</a:t>
+            </a:r>
           </a:p>
           <a:p>
             <a:pPr lvl="1"/>
@@ -4506,35 +4573,21 @@
             <a:pPr lvl="1"/>
             <a:r>
               <a:rPr lang="en-US" sz="1800" dirty="0" smtClean="0"/>
-              <a:t>Mode:  </a:t>
-            </a:r>
+              <a:t>Mode:  0  50</a:t>
+            </a:r>
+          </a:p>
+          <a:p>
+            <a:pPr lvl="1"/>
             <a:r>
               <a:rPr lang="en-US" sz="1800" dirty="0" smtClean="0"/>
-              <a:t>0  50</a:t>
-            </a:r>
-            <a:endParaRPr lang="en-US" sz="1800" dirty="0" smtClean="0"/>
+              <a:t>Std:  12.77</a:t>
+            </a:r>
           </a:p>
           <a:p>
             <a:pPr lvl="1"/>
             <a:r>
               <a:rPr lang="en-US" sz="1800" dirty="0" smtClean="0"/>
-              <a:t>Std:  </a:t>
-            </a:r>
-            <a:r>
-              <a:rPr lang="en-US" sz="1800" dirty="0" smtClean="0"/>
-              <a:t>12.77</a:t>
-            </a:r>
-            <a:endParaRPr lang="en-US" sz="1800" dirty="0" smtClean="0"/>
-          </a:p>
-          <a:p>
-            <a:pPr lvl="1"/>
-            <a:r>
-              <a:rPr lang="en-US" sz="1800" dirty="0" smtClean="0"/>
-              <a:t>Range: 103, </a:t>
-            </a:r>
-            <a:r>
-              <a:rPr lang="en-US" sz="1800" dirty="0" smtClean="0"/>
-              <a:t>4</a:t>
+              <a:t>Range: 103, 4</a:t>
             </a:r>
             <a:br>
               <a:rPr lang="en-US" sz="1800" dirty="0" smtClean="0"/>
@@ -4553,65 +4606,40 @@
               <a:rPr lang="en-US" sz="2000" dirty="0" smtClean="0"/>
               <a:t>TMIN:</a:t>
             </a:r>
-            <a:endParaRPr lang="en-US" sz="2000" dirty="0" smtClean="0"/>
           </a:p>
           <a:p>
             <a:pPr lvl="1"/>
             <a:r>
               <a:rPr lang="en-US" sz="1800" dirty="0" smtClean="0"/>
-              <a:t>Mean: </a:t>
-            </a:r>
+              <a:t>Mean: 44.51</a:t>
+            </a:r>
+          </a:p>
+          <a:p>
+            <a:pPr lvl="1"/>
             <a:r>
               <a:rPr lang="en-US" sz="1800" dirty="0" smtClean="0"/>
-              <a:t>44.51</a:t>
-            </a:r>
-            <a:endParaRPr lang="en-US" sz="1800" dirty="0" smtClean="0"/>
+              <a:t>Median: 45.0</a:t>
+            </a:r>
           </a:p>
           <a:p>
             <a:pPr lvl="1"/>
             <a:r>
               <a:rPr lang="en-US" sz="1800" dirty="0" smtClean="0"/>
-              <a:t>Median: </a:t>
-            </a:r>
+              <a:t>Mode: 0  42</a:t>
+            </a:r>
+          </a:p>
+          <a:p>
+            <a:pPr lvl="1"/>
             <a:r>
               <a:rPr lang="en-US" sz="1800" dirty="0" smtClean="0"/>
-              <a:t>45.0</a:t>
-            </a:r>
-            <a:endParaRPr lang="en-US" sz="1800" dirty="0" smtClean="0"/>
+              <a:t>Std: 8.89</a:t>
+            </a:r>
           </a:p>
           <a:p>
             <a:pPr lvl="1"/>
             <a:r>
               <a:rPr lang="en-US" sz="1800" dirty="0" smtClean="0"/>
-              <a:t>Mode: </a:t>
-            </a:r>
-            <a:r>
-              <a:rPr lang="en-US" sz="1800" dirty="0" smtClean="0"/>
-              <a:t>0  42</a:t>
-            </a:r>
-            <a:endParaRPr lang="en-US" sz="1800" dirty="0" smtClean="0"/>
-          </a:p>
-          <a:p>
-            <a:pPr lvl="1"/>
-            <a:r>
-              <a:rPr lang="en-US" sz="1800" dirty="0" smtClean="0"/>
-              <a:t>Std: </a:t>
-            </a:r>
-            <a:r>
-              <a:rPr lang="en-US" sz="1800" dirty="0" smtClean="0"/>
-              <a:t>8.89</a:t>
-            </a:r>
-            <a:endParaRPr lang="en-US" sz="1800" dirty="0" smtClean="0"/>
-          </a:p>
-          <a:p>
-            <a:pPr lvl="1"/>
-            <a:r>
-              <a:rPr lang="en-US" sz="1800" dirty="0" smtClean="0"/>
-              <a:t>Range: </a:t>
-            </a:r>
-            <a:r>
-              <a:rPr lang="en-US" sz="1800" dirty="0" smtClean="0"/>
-              <a:t>71, 0</a:t>
+              <a:t>Range: 71, 0</a:t>
             </a:r>
           </a:p>
           <a:p>
@@ -4619,55 +4647,33 @@
               <a:rPr lang="en-US" sz="2000" dirty="0" smtClean="0"/>
               <a:t>Rain:</a:t>
             </a:r>
-            <a:endParaRPr lang="en-US" sz="2000" dirty="0" smtClean="0"/>
           </a:p>
           <a:p>
             <a:pPr lvl="1"/>
             <a:r>
               <a:rPr lang="en-US" sz="1800" dirty="0" smtClean="0"/>
-              <a:t>Mean: </a:t>
-            </a:r>
+              <a:t>Mean: 0.43</a:t>
+            </a:r>
+          </a:p>
+          <a:p>
+            <a:pPr lvl="1"/>
             <a:r>
               <a:rPr lang="en-US" sz="1800" dirty="0" smtClean="0"/>
-              <a:t>0.43</a:t>
+              <a:t>Median: 0</a:t>
             </a:r>
           </a:p>
           <a:p>
             <a:pPr lvl="1"/>
             <a:r>
               <a:rPr lang="en-US" sz="1800" dirty="0" smtClean="0"/>
-              <a:t>Median</a:t>
-            </a:r>
+              <a:t>Std: .50</a:t>
+            </a:r>
+          </a:p>
+          <a:p>
+            <a:pPr lvl="1"/>
             <a:r>
               <a:rPr lang="en-US" sz="1800" dirty="0" smtClean="0"/>
-              <a:t>: 0</a:t>
-            </a:r>
-          </a:p>
-          <a:p>
-            <a:pPr lvl="1"/>
-            <a:r>
-              <a:rPr lang="en-US" sz="1800" dirty="0" smtClean="0"/>
-              <a:t>Std</a:t>
-            </a:r>
-            <a:r>
-              <a:rPr lang="en-US" sz="1800" dirty="0" smtClean="0"/>
-              <a:t>: </a:t>
-            </a:r>
-            <a:r>
-              <a:rPr lang="en-US" sz="1800" dirty="0" smtClean="0"/>
-              <a:t>.50</a:t>
-            </a:r>
-            <a:endParaRPr lang="en-US" sz="1800" dirty="0" smtClean="0"/>
-          </a:p>
-          <a:p>
-            <a:pPr lvl="1"/>
-            <a:r>
-              <a:rPr lang="en-US" sz="1800" dirty="0" smtClean="0"/>
-              <a:t>Range: </a:t>
-            </a:r>
-            <a:r>
-              <a:rPr lang="en-US" sz="1800" dirty="0" smtClean="0"/>
-              <a:t>N/A, Boolean value</a:t>
+              <a:t>Range: N/A, Boolean value</a:t>
             </a:r>
             <a:endParaRPr lang="en-US" sz="2000" dirty="0" smtClean="0"/>
           </a:p>
@@ -4683,7 +4689,6 @@
               <a:rPr lang="en-US" sz="1800" dirty="0" smtClean="0"/>
               <a:t>Range 1/1/1948-12/14/2017</a:t>
             </a:r>
-            <a:endParaRPr lang="en-US" sz="1800" dirty="0" smtClean="0"/>
           </a:p>
         </p:txBody>
       </p:sp>
@@ -4961,10 +4966,129 @@
         </p:nvSpPr>
         <p:spPr/>
         <p:txBody>
+          <a:bodyPr>
+            <a:normAutofit/>
+          </a:bodyPr>
+          <a:lstStyle/>
+          <a:p>
+            <a:r>
+              <a:rPr lang="en-US" dirty="0" smtClean="0"/>
+              <a:t>Create 1 </a:t>
+            </a:r>
+            <a:r>
+              <a:rPr lang="en-US" dirty="0" smtClean="0"/>
+              <a:t>CDF</a:t>
+            </a:r>
+            <a:endParaRPr lang="en-US" dirty="0"/>
+          </a:p>
+        </p:txBody>
+      </p:sp>
+      <p:sp>
+        <p:nvSpPr>
+          <p:cNvPr id="3" name="Content Placeholder 2"/>
+          <p:cNvSpPr>
+            <a:spLocks noGrp="1"/>
+          </p:cNvSpPr>
+          <p:nvPr>
+            <p:ph idx="1"/>
+          </p:nvPr>
+        </p:nvSpPr>
+        <p:spPr/>
+        <p:txBody>
           <a:bodyPr/>
           <a:lstStyle/>
           <a:p>
-            <a:endParaRPr lang="en-US"/>
+            <a:r>
+              <a:rPr lang="en-US" dirty="0" smtClean="0"/>
+              <a:t>Here I have plotted the CDF of the amount of rain per year. The curve tells us that we’re not seeing extreme values in the data, as we’d expect if the number of days it rains in Seattle were increasing per year</a:t>
+            </a:r>
+            <a:endParaRPr lang="en-US" dirty="0"/>
+          </a:p>
+        </p:txBody>
+      </p:sp>
+      <p:pic>
+        <p:nvPicPr>
+          <p:cNvPr id="1027" name="Picture 3"/>
+          <p:cNvPicPr>
+            <a:picLocks noChangeAspect="1" noChangeArrowheads="1"/>
+          </p:cNvPicPr>
+          <p:nvPr/>
+        </p:nvPicPr>
+        <p:blipFill>
+          <a:blip r:embed="rId2" cstate="print"/>
+          <a:srcRect/>
+          <a:stretch>
+            <a:fillRect/>
+          </a:stretch>
+        </p:blipFill>
+        <p:spPr bwMode="auto">
+          <a:xfrm>
+            <a:off x="2286000" y="3886200"/>
+            <a:ext cx="4123062" cy="2743200"/>
+          </a:xfrm>
+          <a:prstGeom prst="rect">
+            <a:avLst/>
+          </a:prstGeom>
+          <a:noFill/>
+          <a:ln w="9525">
+            <a:noFill/>
+            <a:miter lim="800000"/>
+            <a:headEnd/>
+            <a:tailEnd/>
+          </a:ln>
+        </p:spPr>
+      </p:pic>
+    </p:spTree>
+  </p:cSld>
+  <p:clrMapOvr>
+    <a:masterClrMapping/>
+  </p:clrMapOvr>
+</p:sld>
+</file>
+
+<file path=ppt/slides/slide8.xml><?xml version="1.0" encoding="utf-8"?>
+<p:sld xmlns:a="http://schemas.openxmlformats.org/drawingml/2006/main" xmlns:r="http://schemas.openxmlformats.org/officeDocument/2006/relationships" xmlns:p="http://schemas.openxmlformats.org/presentationml/2006/main">
+  <p:cSld>
+    <p:spTree>
+      <p:nvGrpSpPr>
+        <p:cNvPr id="1" name=""/>
+        <p:cNvGrpSpPr/>
+        <p:nvPr/>
+      </p:nvGrpSpPr>
+      <p:grpSpPr>
+        <a:xfrm>
+          <a:off x="0" y="0"/>
+          <a:ext cx="0" cy="0"/>
+          <a:chOff x="0" y="0"/>
+          <a:chExt cx="0" cy="0"/>
+        </a:xfrm>
+      </p:grpSpPr>
+      <p:sp>
+        <p:nvSpPr>
+          <p:cNvPr id="2" name="Title 1"/>
+          <p:cNvSpPr>
+            <a:spLocks noGrp="1"/>
+          </p:cNvSpPr>
+          <p:nvPr>
+            <p:ph type="title"/>
+          </p:nvPr>
+        </p:nvSpPr>
+        <p:spPr/>
+        <p:txBody>
+          <a:bodyPr>
+            <a:normAutofit/>
+          </a:bodyPr>
+          <a:lstStyle/>
+          <a:p>
+            <a:r>
+              <a:rPr lang="en-US" dirty="0" smtClean="0"/>
+              <a:t>Plot 1 analytical </a:t>
+            </a:r>
+            <a:r>
+              <a:rPr lang="en-US" dirty="0" smtClean="0"/>
+              <a:t>distribution</a:t>
+            </a:r>
+            <a:endParaRPr lang="en-US" dirty="0"/>
           </a:p>
         </p:txBody>
       </p:sp>
@@ -4983,10 +5107,193 @@
           <a:bodyPr/>
           <a:lstStyle/>
           <a:p>
-            <a:endParaRPr lang="en-US"/>
-          </a:p>
-        </p:txBody>
-      </p:sp>
+            <a:r>
+              <a:rPr lang="en-US" dirty="0" smtClean="0"/>
+              <a:t>This is the plot of number of times it rains per year fitted with a linear regression line. We can see there’s a wide range in where it goes, but unfortunately for my poor hypothesis, the data</a:t>
+            </a:r>
+            <a:br>
+              <a:rPr lang="en-US" dirty="0" smtClean="0"/>
+            </a:br>
+            <a:r>
+              <a:rPr lang="en-US" dirty="0" smtClean="0"/>
+              <a:t>does not agree with it. </a:t>
+            </a:r>
+          </a:p>
+        </p:txBody>
+      </p:sp>
+      <p:pic>
+        <p:nvPicPr>
+          <p:cNvPr id="2050" name="Picture 2"/>
+          <p:cNvPicPr>
+            <a:picLocks noChangeAspect="1" noChangeArrowheads="1"/>
+          </p:cNvPicPr>
+          <p:nvPr/>
+        </p:nvPicPr>
+        <p:blipFill>
+          <a:blip r:embed="rId2" cstate="print"/>
+          <a:srcRect/>
+          <a:stretch>
+            <a:fillRect/>
+          </a:stretch>
+        </p:blipFill>
+        <p:spPr bwMode="auto">
+          <a:xfrm>
+            <a:off x="4953000" y="3124200"/>
+            <a:ext cx="3579962" cy="3429000"/>
+          </a:xfrm>
+          <a:prstGeom prst="rect">
+            <a:avLst/>
+          </a:prstGeom>
+          <a:noFill/>
+          <a:ln w="9525">
+            <a:noFill/>
+            <a:miter lim="800000"/>
+            <a:headEnd/>
+            <a:tailEnd/>
+          </a:ln>
+        </p:spPr>
+      </p:pic>
+    </p:spTree>
+  </p:cSld>
+  <p:clrMapOvr>
+    <a:masterClrMapping/>
+  </p:clrMapOvr>
+</p:sld>
+</file>
+
+<file path=ppt/slides/slide9.xml><?xml version="1.0" encoding="utf-8"?>
+<p:sld xmlns:a="http://schemas.openxmlformats.org/drawingml/2006/main" xmlns:r="http://schemas.openxmlformats.org/officeDocument/2006/relationships" xmlns:p="http://schemas.openxmlformats.org/presentationml/2006/main">
+  <p:cSld>
+    <p:spTree>
+      <p:nvGrpSpPr>
+        <p:cNvPr id="1" name=""/>
+        <p:cNvGrpSpPr/>
+        <p:nvPr/>
+      </p:nvGrpSpPr>
+      <p:grpSpPr>
+        <a:xfrm>
+          <a:off x="0" y="0"/>
+          <a:ext cx="0" cy="0"/>
+          <a:chOff x="0" y="0"/>
+          <a:chExt cx="0" cy="0"/>
+        </a:xfrm>
+      </p:grpSpPr>
+      <p:sp>
+        <p:nvSpPr>
+          <p:cNvPr id="2" name="Title 1"/>
+          <p:cNvSpPr>
+            <a:spLocks noGrp="1"/>
+          </p:cNvSpPr>
+          <p:nvPr>
+            <p:ph type="title"/>
+          </p:nvPr>
+        </p:nvSpPr>
+        <p:spPr/>
+        <p:txBody>
+          <a:bodyPr>
+            <a:normAutofit fontScale="90000"/>
+          </a:bodyPr>
+          <a:lstStyle/>
+          <a:p>
+            <a:r>
+              <a:rPr lang="en-US" dirty="0" smtClean="0"/>
+              <a:t>Create two scatter plots comparing two variables</a:t>
+            </a:r>
+            <a:endParaRPr lang="en-US" dirty="0"/>
+          </a:p>
+        </p:txBody>
+      </p:sp>
+      <p:sp>
+        <p:nvSpPr>
+          <p:cNvPr id="11" name="Content Placeholder 10"/>
+          <p:cNvSpPr>
+            <a:spLocks noGrp="1"/>
+          </p:cNvSpPr>
+          <p:nvPr>
+            <p:ph sz="half" idx="1"/>
+          </p:nvPr>
+        </p:nvSpPr>
+        <p:spPr/>
+        <p:txBody>
+          <a:bodyPr>
+            <a:normAutofit fontScale="92500" lnSpcReduction="10000"/>
+          </a:bodyPr>
+          <a:lstStyle/>
+          <a:p>
+            <a:r>
+              <a:rPr lang="en-US" dirty="0" smtClean="0"/>
+              <a:t>This is comparing the min and maximum temperatures. In the correlation heat map we can see a high correlation between the min and max as well. Since temperatures are connected, it makes sense that those two variables have a relationship of causation not just correlation.  </a:t>
+            </a:r>
+            <a:endParaRPr lang="en-US" dirty="0"/>
+          </a:p>
+        </p:txBody>
+      </p:sp>
+      <p:pic>
+        <p:nvPicPr>
+          <p:cNvPr id="3076" name="Picture 4"/>
+          <p:cNvPicPr>
+            <a:picLocks noGrp="1" noChangeAspect="1" noChangeArrowheads="1"/>
+          </p:cNvPicPr>
+          <p:nvPr>
+            <p:ph sz="half" idx="2"/>
+          </p:nvPr>
+        </p:nvPicPr>
+        <p:blipFill>
+          <a:blip r:embed="rId2" cstate="print"/>
+          <a:srcRect/>
+          <a:stretch>
+            <a:fillRect/>
+          </a:stretch>
+        </p:blipFill>
+        <p:spPr bwMode="auto">
+          <a:xfrm>
+            <a:off x="4648200" y="1295400"/>
+            <a:ext cx="4038600" cy="3267719"/>
+          </a:xfrm>
+          <a:prstGeom prst="rect">
+            <a:avLst/>
+          </a:prstGeom>
+          <a:noFill/>
+          <a:ln w="9525">
+            <a:noFill/>
+            <a:miter lim="800000"/>
+            <a:headEnd/>
+            <a:tailEnd/>
+          </a:ln>
+        </p:spPr>
+      </p:pic>
+      <p:pic>
+        <p:nvPicPr>
+          <p:cNvPr id="3077" name="Picture 5"/>
+          <p:cNvPicPr>
+            <a:picLocks noChangeAspect="1" noChangeArrowheads="1"/>
+          </p:cNvPicPr>
+          <p:nvPr/>
+        </p:nvPicPr>
+        <p:blipFill>
+          <a:blip r:embed="rId3" cstate="print"/>
+          <a:srcRect/>
+          <a:stretch>
+            <a:fillRect/>
+          </a:stretch>
+        </p:blipFill>
+        <p:spPr bwMode="auto">
+          <a:xfrm>
+            <a:off x="5410200" y="4648200"/>
+            <a:ext cx="2667000" cy="1922615"/>
+          </a:xfrm>
+          <a:prstGeom prst="rect">
+            <a:avLst/>
+          </a:prstGeom>
+          <a:noFill/>
+          <a:ln w="9525">
+            <a:noFill/>
+            <a:miter lim="800000"/>
+            <a:headEnd/>
+            <a:tailEnd/>
+          </a:ln>
+        </p:spPr>
+      </p:pic>
     </p:spTree>
   </p:cSld>
   <p:clrMapOvr>

</xml_diff>

<commit_message>
fixed bad image on ppt
</commit_message>
<xml_diff>
--- a/530 Final.pptx
+++ b/530 Final.pptx
@@ -290,7 +290,7 @@
             <a:fld id="{1D8BD707-D9CF-40AE-B4C6-C98DA3205C09}" type="datetimeFigureOut">
               <a:rPr lang="en-US" smtClean="0"/>
               <a:pPr/>
-              <a:t>8/6/2018</a:t>
+              <a:t>8/7/2018</a:t>
             </a:fld>
             <a:endParaRPr lang="en-US"/>
           </a:p>
@@ -457,7 +457,7 @@
             <a:fld id="{1D8BD707-D9CF-40AE-B4C6-C98DA3205C09}" type="datetimeFigureOut">
               <a:rPr lang="en-US" smtClean="0"/>
               <a:pPr/>
-              <a:t>8/6/2018</a:t>
+              <a:t>8/7/2018</a:t>
             </a:fld>
             <a:endParaRPr lang="en-US"/>
           </a:p>
@@ -634,7 +634,7 @@
             <a:fld id="{1D8BD707-D9CF-40AE-B4C6-C98DA3205C09}" type="datetimeFigureOut">
               <a:rPr lang="en-US" smtClean="0"/>
               <a:pPr/>
-              <a:t>8/6/2018</a:t>
+              <a:t>8/7/2018</a:t>
             </a:fld>
             <a:endParaRPr lang="en-US"/>
           </a:p>
@@ -801,7 +801,7 @@
             <a:fld id="{1D8BD707-D9CF-40AE-B4C6-C98DA3205C09}" type="datetimeFigureOut">
               <a:rPr lang="en-US" smtClean="0"/>
               <a:pPr/>
-              <a:t>8/6/2018</a:t>
+              <a:t>8/7/2018</a:t>
             </a:fld>
             <a:endParaRPr lang="en-US"/>
           </a:p>
@@ -1045,7 +1045,7 @@
             <a:fld id="{1D8BD707-D9CF-40AE-B4C6-C98DA3205C09}" type="datetimeFigureOut">
               <a:rPr lang="en-US" smtClean="0"/>
               <a:pPr/>
-              <a:t>8/6/2018</a:t>
+              <a:t>8/7/2018</a:t>
             </a:fld>
             <a:endParaRPr lang="en-US"/>
           </a:p>
@@ -1311,7 +1311,7 @@
             <a:fld id="{1D8BD707-D9CF-40AE-B4C6-C98DA3205C09}" type="datetimeFigureOut">
               <a:rPr lang="en-US" smtClean="0"/>
               <a:pPr/>
-              <a:t>8/6/2018</a:t>
+              <a:t>8/7/2018</a:t>
             </a:fld>
             <a:endParaRPr lang="en-US"/>
           </a:p>
@@ -1691,7 +1691,7 @@
             <a:fld id="{1D8BD707-D9CF-40AE-B4C6-C98DA3205C09}" type="datetimeFigureOut">
               <a:rPr lang="en-US" smtClean="0"/>
               <a:pPr/>
-              <a:t>8/6/2018</a:t>
+              <a:t>8/7/2018</a:t>
             </a:fld>
             <a:endParaRPr lang="en-US"/>
           </a:p>
@@ -1843,7 +1843,7 @@
             <a:fld id="{1D8BD707-D9CF-40AE-B4C6-C98DA3205C09}" type="datetimeFigureOut">
               <a:rPr lang="en-US" smtClean="0"/>
               <a:pPr/>
-              <a:t>8/6/2018</a:t>
+              <a:t>8/7/2018</a:t>
             </a:fld>
             <a:endParaRPr lang="en-US"/>
           </a:p>
@@ -1935,7 +1935,7 @@
             <a:fld id="{1D8BD707-D9CF-40AE-B4C6-C98DA3205C09}" type="datetimeFigureOut">
               <a:rPr lang="en-US" smtClean="0"/>
               <a:pPr/>
-              <a:t>8/6/2018</a:t>
+              <a:t>8/7/2018</a:t>
             </a:fld>
             <a:endParaRPr lang="en-US"/>
           </a:p>
@@ -2198,7 +2198,7 @@
             <a:fld id="{1D8BD707-D9CF-40AE-B4C6-C98DA3205C09}" type="datetimeFigureOut">
               <a:rPr lang="en-US" smtClean="0"/>
               <a:pPr/>
-              <a:t>8/6/2018</a:t>
+              <a:t>8/7/2018</a:t>
             </a:fld>
             <a:endParaRPr lang="en-US"/>
           </a:p>
@@ -2488,7 +2488,7 @@
             <a:fld id="{1D8BD707-D9CF-40AE-B4C6-C98DA3205C09}" type="datetimeFigureOut">
               <a:rPr lang="en-US" smtClean="0"/>
               <a:pPr/>
-              <a:t>8/6/2018</a:t>
+              <a:t>8/7/2018</a:t>
             </a:fld>
             <a:endParaRPr lang="en-US"/>
           </a:p>
@@ -3261,7 +3261,7 @@
             <a:fld id="{1D8BD707-D9CF-40AE-B4C6-C98DA3205C09}" type="datetimeFigureOut">
               <a:rPr lang="en-US" smtClean="0"/>
               <a:pPr/>
-              <a:t>8/6/2018</a:t>
+              <a:t>8/7/2018</a:t>
             </a:fld>
             <a:endParaRPr lang="en-US"/>
           </a:p>
@@ -4023,7 +4023,6 @@
               <a:rPr lang="en-US" dirty="0" smtClean="0"/>
               <a:t>).fit() </a:t>
             </a:r>
-            <a:endParaRPr lang="en-US" dirty="0" smtClean="0"/>
           </a:p>
           <a:p>
             <a:r>
@@ -4040,15 +4039,7 @@
             </a:r>
             <a:r>
               <a:rPr lang="en-US" dirty="0" smtClean="0"/>
-              <a:t> of the intercept </a:t>
-            </a:r>
-            <a:r>
-              <a:rPr lang="en-US" dirty="0" smtClean="0"/>
-              <a:t>are </a:t>
-            </a:r>
-            <a:r>
-              <a:rPr lang="en-US" dirty="0" smtClean="0"/>
-              <a:t>0.039904,  and close but not statistically significant. </a:t>
+              <a:t> of the intercept are 0.039904,  and close but not statistically significant. </a:t>
             </a:r>
           </a:p>
         </p:txBody>
@@ -4282,40 +4273,6 @@
           </a:p>
         </p:txBody>
       </p:sp>
-      <p:pic>
-        <p:nvPicPr>
-          <p:cNvPr id="1027" name="Picture 3"/>
-          <p:cNvPicPr>
-            <a:picLocks noGrp="1" noChangeAspect="1" noChangeArrowheads="1"/>
-          </p:cNvPicPr>
-          <p:nvPr>
-            <p:ph idx="1"/>
-          </p:nvPr>
-        </p:nvPicPr>
-        <p:blipFill>
-          <a:blip r:embed="rId2" cstate="print"/>
-          <a:srcRect/>
-          <a:stretch>
-            <a:fillRect/>
-          </a:stretch>
-        </p:blipFill>
-        <p:spPr bwMode="auto">
-          <a:xfrm>
-            <a:off x="457200" y="1828800"/>
-            <a:ext cx="3198180" cy="2172809"/>
-          </a:xfrm>
-          <a:prstGeom prst="rect">
-            <a:avLst/>
-          </a:prstGeom>
-          <a:noFill/>
-          <a:ln w="9525">
-            <a:noFill/>
-            <a:miter lim="800000"/>
-            <a:headEnd/>
-            <a:tailEnd/>
-          </a:ln>
-        </p:spPr>
-      </p:pic>
       <p:pic>
         <p:nvPicPr>
           <p:cNvPr id="1028" name="Picture 4"/>
@@ -4442,6 +4399,40 @@
           </a:p>
         </p:txBody>
       </p:sp>
+      <p:pic>
+        <p:nvPicPr>
+          <p:cNvPr id="1026" name="Picture 2"/>
+          <p:cNvPicPr>
+            <a:picLocks noGrp="1" noChangeAspect="1" noChangeArrowheads="1"/>
+          </p:cNvPicPr>
+          <p:nvPr>
+            <p:ph idx="1"/>
+          </p:nvPr>
+        </p:nvPicPr>
+        <p:blipFill>
+          <a:blip r:embed="rId5" cstate="print"/>
+          <a:srcRect/>
+          <a:stretch>
+            <a:fillRect/>
+          </a:stretch>
+        </p:blipFill>
+        <p:spPr bwMode="auto">
+          <a:xfrm>
+            <a:off x="609600" y="1828800"/>
+            <a:ext cx="3200400" cy="2249100"/>
+          </a:xfrm>
+          <a:prstGeom prst="rect">
+            <a:avLst/>
+          </a:prstGeom>
+          <a:noFill/>
+          <a:ln w="9525">
+            <a:noFill/>
+            <a:miter lim="800000"/>
+            <a:headEnd/>
+            <a:tailEnd/>
+          </a:ln>
+        </p:spPr>
+      </p:pic>
     </p:spTree>
   </p:cSld>
   <p:clrMapOvr>
@@ -4973,11 +4964,7 @@
           <a:p>
             <a:r>
               <a:rPr lang="en-US" dirty="0" smtClean="0"/>
-              <a:t>Create 1 </a:t>
-            </a:r>
-            <a:r>
-              <a:rPr lang="en-US" dirty="0" smtClean="0"/>
-              <a:t>CDF</a:t>
+              <a:t>Create 1 CDF</a:t>
             </a:r>
             <a:endParaRPr lang="en-US" dirty="0"/>
           </a:p>
@@ -5082,11 +5069,7 @@
           <a:p>
             <a:r>
               <a:rPr lang="en-US" dirty="0" smtClean="0"/>
-              <a:t>Plot 1 analytical </a:t>
-            </a:r>
-            <a:r>
-              <a:rPr lang="en-US" dirty="0" smtClean="0"/>
-              <a:t>distribution</a:t>
+              <a:t>Plot 1 analytical distribution</a:t>
             </a:r>
             <a:endParaRPr lang="en-US" dirty="0"/>
           </a:p>

</xml_diff>